<commit_message>
MAJ du texte SYSML A faire
</commit_message>
<xml_diff>
--- a/Concevoir/06_ConceptionsDiverses/TD_09_GrueHydraulique/images/Figures.pptx
+++ b/Concevoir/06_ConceptionsDiverses/TD_09_GrueHydraulique/images/Figures.pptx
@@ -19699,7 +19699,7 @@
         <p:spPr>
           <a:xfrm>
             <a:off x="5652120" y="3425791"/>
-            <a:ext cx="3240360" cy="0"/>
+            <a:ext cx="2520360" cy="0"/>
           </a:xfrm>
           <a:prstGeom prst="line">
             <a:avLst/>
@@ -19709,41 +19709,6 @@
               <a:schemeClr val="tx2"/>
             </a:solidFill>
             <a:prstDash val="lgDashDot"/>
-          </a:ln>
-        </p:spPr>
-        <p:style>
-          <a:lnRef idx="1">
-            <a:schemeClr val="accent1"/>
-          </a:lnRef>
-          <a:fillRef idx="0">
-            <a:schemeClr val="accent1"/>
-          </a:fillRef>
-          <a:effectRef idx="0">
-            <a:schemeClr val="accent1"/>
-          </a:effectRef>
-          <a:fontRef idx="minor">
-            <a:schemeClr val="tx1"/>
-          </a:fontRef>
-        </p:style>
-      </p:cxnSp>
-      <p:cxnSp>
-        <p:nvCxnSpPr>
-          <p:cNvPr id="11" name="Connecteur droit 10"/>
-          <p:cNvCxnSpPr/>
-          <p:nvPr/>
-        </p:nvCxnSpPr>
-        <p:spPr>
-          <a:xfrm flipH="1">
-            <a:off x="7019273" y="1619703"/>
-            <a:ext cx="1427655" cy="0"/>
-          </a:xfrm>
-          <a:prstGeom prst="line">
-            <a:avLst/>
-          </a:prstGeom>
-          <a:ln w="28575">
-            <a:solidFill>
-              <a:schemeClr val="tx2"/>
-            </a:solidFill>
           </a:ln>
         </p:spPr>
         <p:style>
@@ -19770,7 +19735,7 @@
         <p:spPr>
           <a:xfrm>
             <a:off x="6827904" y="1835775"/>
-            <a:ext cx="2136584" cy="0"/>
+            <a:ext cx="1344576" cy="0"/>
           </a:xfrm>
           <a:prstGeom prst="line">
             <a:avLst/>
@@ -19799,14 +19764,49 @@
       </p:cxnSp>
       <p:cxnSp>
         <p:nvCxnSpPr>
+          <p:cNvPr id="11" name="Connecteur droit 10"/>
+          <p:cNvCxnSpPr/>
+          <p:nvPr/>
+        </p:nvCxnSpPr>
+        <p:spPr>
+          <a:xfrm flipH="1">
+            <a:off x="7024846" y="1681417"/>
+            <a:ext cx="1005517" cy="0"/>
+          </a:xfrm>
+          <a:prstGeom prst="line">
+            <a:avLst/>
+          </a:prstGeom>
+          <a:ln w="28575">
+            <a:solidFill>
+              <a:schemeClr val="tx2"/>
+            </a:solidFill>
+          </a:ln>
+        </p:spPr>
+        <p:style>
+          <a:lnRef idx="1">
+            <a:schemeClr val="accent1"/>
+          </a:lnRef>
+          <a:fillRef idx="0">
+            <a:schemeClr val="accent1"/>
+          </a:fillRef>
+          <a:effectRef idx="0">
+            <a:schemeClr val="accent1"/>
+          </a:effectRef>
+          <a:fontRef idx="minor">
+            <a:schemeClr val="tx1"/>
+          </a:fontRef>
+        </p:style>
+      </p:cxnSp>
+      <p:cxnSp>
+        <p:nvCxnSpPr>
           <p:cNvPr id="13" name="Connecteur droit 12"/>
           <p:cNvCxnSpPr/>
           <p:nvPr/>
         </p:nvCxnSpPr>
         <p:spPr>
           <a:xfrm flipH="1">
-            <a:off x="7013142" y="2051847"/>
-            <a:ext cx="1433786" cy="0"/>
+            <a:off x="7020528" y="1985782"/>
+            <a:ext cx="1009835" cy="0"/>
           </a:xfrm>
           <a:prstGeom prst="line">
             <a:avLst/>
@@ -19840,8 +19840,8 @@
         </p:nvCxnSpPr>
         <p:spPr>
           <a:xfrm>
-            <a:off x="8446928" y="1619703"/>
-            <a:ext cx="0" cy="432144"/>
+            <a:off x="8030363" y="1681417"/>
+            <a:ext cx="0" cy="304365"/>
           </a:xfrm>
           <a:prstGeom prst="line">
             <a:avLst/>
@@ -19875,8 +19875,8 @@
         </p:nvCxnSpPr>
         <p:spPr>
           <a:xfrm>
-            <a:off x="8446928" y="1619703"/>
-            <a:ext cx="84465" cy="216120"/>
+            <a:off x="8030363" y="1681417"/>
+            <a:ext cx="59490" cy="152216"/>
           </a:xfrm>
           <a:prstGeom prst="line">
             <a:avLst/>
@@ -19910,8 +19910,8 @@
         </p:nvCxnSpPr>
         <p:spPr>
           <a:xfrm flipH="1">
-            <a:off x="8446928" y="1835775"/>
-            <a:ext cx="84465" cy="216072"/>
+            <a:off x="8030363" y="1833600"/>
+            <a:ext cx="59490" cy="152182"/>
           </a:xfrm>
           <a:prstGeom prst="line">
             <a:avLst/>
@@ -19945,8 +19945,8 @@
         </p:nvCxnSpPr>
         <p:spPr>
           <a:xfrm flipH="1">
-            <a:off x="7019225" y="1547743"/>
-            <a:ext cx="1224136" cy="48"/>
+            <a:off x="7024812" y="1630735"/>
+            <a:ext cx="862176" cy="34"/>
           </a:xfrm>
           <a:prstGeom prst="line">
             <a:avLst/>
@@ -19980,8 +19980,8 @@
         </p:nvCxnSpPr>
         <p:spPr>
           <a:xfrm flipH="1">
-            <a:off x="7019177" y="2123807"/>
-            <a:ext cx="1224184" cy="48"/>
+            <a:off x="7024779" y="2036464"/>
+            <a:ext cx="862210" cy="34"/>
           </a:xfrm>
           <a:prstGeom prst="line">
             <a:avLst/>
@@ -20015,8 +20015,8 @@
         </p:nvCxnSpPr>
         <p:spPr>
           <a:xfrm flipV="1">
-            <a:off x="8243361" y="1547743"/>
-            <a:ext cx="0" cy="576064"/>
+            <a:off x="7886988" y="1630735"/>
+            <a:ext cx="0" cy="405729"/>
           </a:xfrm>
           <a:prstGeom prst="line">
             <a:avLst/>

</xml_diff>